<commit_message>
adding back in missing analysis code
</commit_message>
<xml_diff>
--- a/inst/presentations/CWhittaker_WASPP_YogKickoffModellingMeetingSlides_22ndJan25.pptx
+++ b/inst/presentations/CWhittaker_WASPP_YogKickoffModellingMeetingSlides_22ndJan25.pptx
@@ -6778,7 +6778,7 @@
         </p:spPr>
         <p:txBody>
           <a:bodyPr>
-            <a:normAutofit lnSpcReduction="10000"/>
+            <a:normAutofit fontScale="92500" lnSpcReduction="20000"/>
           </a:bodyPr>
           <a:lstStyle/>
           <a:p>
@@ -6788,9 +6788,16 @@
             </a:r>
           </a:p>
           <a:p>
+            <a:pPr lvl="1"/>
             <a:r>
               <a:rPr lang="en-US" dirty="0"/>
-              <a:t>Vary assumed:</a:t>
+              <a:t>Assume fortnightly wastewater sampling with autosampler.</a:t>
+            </a:r>
+          </a:p>
+          <a:p>
+            <a:r>
+              <a:rPr lang="en-US" dirty="0"/>
+              <a:t>Vary:</a:t>
             </a:r>
           </a:p>
           <a:p>
@@ -6823,8 +6830,13 @@
             </a:r>
             <a:r>
               <a:rPr lang="en-US" dirty="0"/>
-              <a:t> (10%, 50% or 90%). </a:t>
-            </a:r>
+              <a:t> (10%, 50% or 90% of symptomatic infections </a:t>
+            </a:r>
+            <a:r>
+              <a:rPr lang="en-US"/>
+              <a:t>seek healthcare). </a:t>
+            </a:r>
+            <a:endParaRPr lang="en-US" dirty="0"/>
           </a:p>
           <a:p>
             <a:pPr lvl="1"/>

</xml_diff>